<commit_message>
Add a slide about the need for a folder
Resolves #1 - a folder is required for remote sync configuration

also adds slides for manually verifying and reloading the configuration
</commit_message>
<xml_diff>
--- a/Configure_Remote_Editing.pptx
+++ b/Configure_Remote_Editing.pptx
@@ -5,10 +5,10 @@
     <p:sldMasterId id="2147483705" r:id="rId5"/>
   </p:sldMasterIdLst>
   <p:notesMasterIdLst>
-    <p:notesMasterId r:id="rId22"/>
+    <p:notesMasterId r:id="rId24"/>
   </p:notesMasterIdLst>
   <p:handoutMasterIdLst>
-    <p:handoutMasterId r:id="rId23"/>
+    <p:handoutMasterId r:id="rId25"/>
   </p:handoutMasterIdLst>
   <p:sldIdLst>
     <p:sldId id="256" r:id="rId6"/>
@@ -19,14 +19,16 @@
     <p:sldId id="261" r:id="rId11"/>
     <p:sldId id="262" r:id="rId12"/>
     <p:sldId id="263" r:id="rId13"/>
-    <p:sldId id="264" r:id="rId14"/>
+    <p:sldId id="273" r:id="rId14"/>
     <p:sldId id="266" r:id="rId15"/>
     <p:sldId id="267" r:id="rId16"/>
     <p:sldId id="268" r:id="rId17"/>
     <p:sldId id="269" r:id="rId18"/>
-    <p:sldId id="270" r:id="rId19"/>
-    <p:sldId id="271" r:id="rId20"/>
-    <p:sldId id="272" r:id="rId21"/>
+    <p:sldId id="274" r:id="rId19"/>
+    <p:sldId id="275" r:id="rId20"/>
+    <p:sldId id="270" r:id="rId21"/>
+    <p:sldId id="271" r:id="rId22"/>
+    <p:sldId id="272" r:id="rId23"/>
   </p:sldIdLst>
   <p:sldSz cx="12192000" cy="6858000"/>
   <p:notesSz cx="6858000" cy="9144000"/>
@@ -127,10 +129,10 @@
   </p:defaultTextStyle>
   <p:extLst>
     <p:ext uri="{EFAFB233-063F-42B5-8137-9DF3F51BA10A}">
-      <p15:sldGuideLst xmlns:p15="http://schemas.microsoft.com/office/powerpoint/2012/main" xmlns=""/>
+      <p15:sldGuideLst xmlns="" xmlns:p15="http://schemas.microsoft.com/office/powerpoint/2012/main"/>
     </p:ext>
     <p:ext uri="{2D200454-40CA-4A62-9FC3-DE9A4176ACB9}">
-      <p15:notesGuideLst xmlns:p15="http://schemas.microsoft.com/office/powerpoint/2012/main" xmlns="">
+      <p15:notesGuideLst xmlns="" xmlns:p15="http://schemas.microsoft.com/office/powerpoint/2012/main">
         <p15:guide id="1" orient="horz" pos="2880">
           <p15:clr>
             <a:srgbClr val="A4A3A4"/>
@@ -235,7 +237,7 @@
                 <a:latin typeface="Arial" panose="020B0604020202020204" pitchFamily="34" charset="0"/>
                 <a:cs typeface="Arial" panose="020B0604020202020204" pitchFamily="34" charset="0"/>
               </a:rPr>
-              <a:t>12/3/14</a:t>
+              <a:t>12/8/14</a:t>
             </a:fld>
             <a:endParaRPr lang="en-US" dirty="0">
               <a:latin typeface="Arial" panose="020B0604020202020204" pitchFamily="34" charset="0"/>
@@ -390,7 +392,7 @@
             <a:fld id="{BFFFB994-B51A-7449-B85A-B64DF9DCCDDC}" type="datetime1">
               <a:rPr lang="en-CA" smtClean="0"/>
               <a:pPr/>
-              <a:t>12/3/14</a:t>
+              <a:t>12/8/14</a:t>
             </a:fld>
             <a:endParaRPr lang="en-US" dirty="0"/>
           </a:p>
@@ -1037,15 +1039,6 @@
               </a:rPr>
               <a:t>v0.0.1</a:t>
             </a:r>
-            <a:endParaRPr lang="en-US" sz="1000" dirty="0" smtClean="0">
-              <a:solidFill>
-                <a:schemeClr val="accent3">
-                  <a:lumMod val="50000"/>
-                </a:schemeClr>
-              </a:solidFill>
-              <a:latin typeface="+mn-lt"/>
-              <a:cs typeface="Courier"/>
-            </a:endParaRPr>
           </a:p>
         </p:txBody>
       </p:sp>
@@ -5002,15 +4995,6 @@
               </a:rPr>
               <a:t>v0.0.1</a:t>
             </a:r>
-            <a:endParaRPr lang="en-US" sz="1000" dirty="0" smtClean="0">
-              <a:solidFill>
-                <a:schemeClr val="accent3">
-                  <a:lumMod val="50000"/>
-                </a:schemeClr>
-              </a:solidFill>
-              <a:latin typeface="+mn-lt"/>
-              <a:cs typeface="Courier"/>
-            </a:endParaRPr>
           </a:p>
         </p:txBody>
       </p:sp>
@@ -6837,15 +6821,6 @@
               </a:rPr>
               <a:t>v0.0.1</a:t>
             </a:r>
-            <a:endParaRPr lang="en-US" sz="1000" dirty="0" smtClean="0">
-              <a:solidFill>
-                <a:schemeClr val="accent3">
-                  <a:lumMod val="50000"/>
-                </a:schemeClr>
-              </a:solidFill>
-              <a:latin typeface="+mn-lt"/>
-              <a:cs typeface="Courier"/>
-            </a:endParaRPr>
           </a:p>
         </p:txBody>
       </p:sp>
@@ -7117,15 +7092,6 @@
               </a:rPr>
               <a:t>v0.0.1</a:t>
             </a:r>
-            <a:endParaRPr lang="en-US" sz="1000" dirty="0" smtClean="0">
-              <a:solidFill>
-                <a:schemeClr val="accent3">
-                  <a:lumMod val="50000"/>
-                </a:schemeClr>
-              </a:solidFill>
-              <a:latin typeface="+mn-lt"/>
-              <a:cs typeface="Courier"/>
-            </a:endParaRPr>
           </a:p>
         </p:txBody>
       </p:sp>
@@ -8979,7 +8945,7 @@
   </p:txStyles>
   <p:extLst mod="1">
     <p:ext uri="{27BBF7A9-308A-43DC-89C8-2F10F3537804}">
-      <p15:sldGuideLst xmlns:p15="http://schemas.microsoft.com/office/powerpoint/2012/main" xmlns="">
+      <p15:sldGuideLst xmlns="" xmlns:p15="http://schemas.microsoft.com/office/powerpoint/2012/main">
         <p15:guide id="1" pos="3840" userDrawn="1">
           <p15:clr>
             <a:srgbClr val="F26B43"/>
@@ -9591,6 +9557,13 @@
               <a:rPr lang="nl-NL" dirty="0" smtClean="0"/>
               <a:t>*</a:t>
             </a:r>
+          </a:p>
+          <a:p>
+            <a:pPr lvl="1"/>
+            <a:r>
+              <a:rPr lang="nl-NL" dirty="0" smtClean="0"/>
+              <a:t>.git/**</a:t>
+            </a:r>
             <a:endParaRPr lang="en-US" dirty="0"/>
           </a:p>
         </p:txBody>
@@ -9873,7 +9846,7 @@
       </p:grpSpPr>
       <p:sp>
         <p:nvSpPr>
-          <p:cNvPr id="2" name="Title 1"/>
+          <p:cNvPr id="6" name="Title 5"/>
           <p:cNvSpPr>
             <a:spLocks noGrp="1"/>
           </p:cNvSpPr>
@@ -9888,37 +9861,12 @@
           <a:p>
             <a:r>
               <a:rPr lang="en-US" dirty="0" smtClean="0"/>
-              <a:t>Remote Sync: Download All</a:t>
+              <a:t>Verify Configuration</a:t>
             </a:r>
             <a:endParaRPr lang="en-US" dirty="0"/>
           </a:p>
         </p:txBody>
       </p:sp>
-      <p:pic>
-        <p:nvPicPr>
-          <p:cNvPr id="8" name="Picture Placeholder 7" descr=".remote-sync.json - _Users_nathenharvey_Desktop_giltsync - Atom-1.jpg"/>
-          <p:cNvPicPr>
-            <a:picLocks noGrp="1" noChangeAspect="1"/>
-          </p:cNvPicPr>
-          <p:nvPr>
-            <p:ph type="pic" sz="quarter" idx="10"/>
-          </p:nvPr>
-        </p:nvPicPr>
-        <p:blipFill>
-          <a:blip r:embed="rId2">
-            <a:extLst>
-              <a:ext uri="{28A0092B-C50C-407E-A947-70E740481C1C}">
-                <a14:useLocalDpi xmlns:a14="http://schemas.microsoft.com/office/drawing/2010/main" val="0"/>
-              </a:ext>
-            </a:extLst>
-          </a:blip>
-          <a:srcRect l="-22383" r="-22383"/>
-          <a:stretch>
-            <a:fillRect/>
-          </a:stretch>
-        </p:blipFill>
-        <p:spPr/>
-      </p:pic>
       <p:sp>
         <p:nvSpPr>
           <p:cNvPr id="7" name="Content Placeholder 6"/>
@@ -9926,22 +9874,529 @@
             <a:spLocks noGrp="1"/>
           </p:cNvSpPr>
           <p:nvPr>
-            <p:ph sz="quarter" idx="11"/>
+            <p:ph sz="quarter" idx="10"/>
           </p:nvPr>
         </p:nvSpPr>
         <p:spPr/>
         <p:txBody>
-          <a:bodyPr/>
+          <a:bodyPr>
+            <a:normAutofit fontScale="62500" lnSpcReduction="20000"/>
+          </a:bodyPr>
           <a:lstStyle/>
           <a:p>
-            <a:endParaRPr lang="en-US"/>
+            <a:r>
+              <a:rPr lang="en-US" b="1" dirty="0">
+                <a:solidFill>
+                  <a:srgbClr val="000000"/>
+                </a:solidFill>
+              </a:rPr>
+              <a:t>{</a:t>
+            </a:r>
+          </a:p>
+          <a:p>
+            <a:r>
+              <a:rPr lang="en-US" dirty="0"/>
+              <a:t>  </a:t>
+            </a:r>
+            <a:r>
+              <a:rPr lang="en-US" b="1" dirty="0">
+                <a:solidFill>
+                  <a:srgbClr val="204A87"/>
+                </a:solidFill>
+              </a:rPr>
+              <a:t>"transport"</a:t>
+            </a:r>
+            <a:r>
+              <a:rPr lang="en-US" b="1" dirty="0">
+                <a:solidFill>
+                  <a:srgbClr val="000000"/>
+                </a:solidFill>
+              </a:rPr>
+              <a:t>: </a:t>
+            </a:r>
+            <a:r>
+              <a:rPr lang="en-US" b="1" dirty="0">
+                <a:solidFill>
+                  <a:srgbClr val="4E9A06"/>
+                </a:solidFill>
+              </a:rPr>
+              <a:t>"</a:t>
+            </a:r>
+            <a:r>
+              <a:rPr lang="en-US" b="1" dirty="0" err="1">
+                <a:solidFill>
+                  <a:srgbClr val="4E9A06"/>
+                </a:solidFill>
+              </a:rPr>
+              <a:t>scp</a:t>
+            </a:r>
+            <a:r>
+              <a:rPr lang="en-US" b="1" dirty="0">
+                <a:solidFill>
+                  <a:srgbClr val="4E9A06"/>
+                </a:solidFill>
+              </a:rPr>
+              <a:t>"</a:t>
+            </a:r>
+            <a:r>
+              <a:rPr lang="en-US" b="1" dirty="0">
+                <a:solidFill>
+                  <a:srgbClr val="000000"/>
+                </a:solidFill>
+              </a:rPr>
+              <a:t>,</a:t>
+            </a:r>
+          </a:p>
+          <a:p>
+            <a:r>
+              <a:rPr lang="en-US" dirty="0"/>
+              <a:t>  </a:t>
+            </a:r>
+            <a:r>
+              <a:rPr lang="en-US" b="1" dirty="0">
+                <a:solidFill>
+                  <a:srgbClr val="204A87"/>
+                </a:solidFill>
+              </a:rPr>
+              <a:t>"hostname"</a:t>
+            </a:r>
+            <a:r>
+              <a:rPr lang="en-US" b="1" dirty="0">
+                <a:solidFill>
+                  <a:srgbClr val="000000"/>
+                </a:solidFill>
+              </a:rPr>
+              <a:t>: </a:t>
+            </a:r>
+            <a:r>
+              <a:rPr lang="en-US" b="1" dirty="0">
+                <a:solidFill>
+                  <a:srgbClr val="4E9A06"/>
+                </a:solidFill>
+              </a:rPr>
+              <a:t>"THE_REMOTE_IP_ADDRESS"</a:t>
+            </a:r>
+            <a:r>
+              <a:rPr lang="en-US" b="1" dirty="0">
+                <a:solidFill>
+                  <a:srgbClr val="000000"/>
+                </a:solidFill>
+              </a:rPr>
+              <a:t>,</a:t>
+            </a:r>
+          </a:p>
+          <a:p>
+            <a:r>
+              <a:rPr lang="en-US" dirty="0"/>
+              <a:t>  </a:t>
+            </a:r>
+            <a:r>
+              <a:rPr lang="en-US" b="1" dirty="0">
+                <a:solidFill>
+                  <a:srgbClr val="204A87"/>
+                </a:solidFill>
+              </a:rPr>
+              <a:t>"port"</a:t>
+            </a:r>
+            <a:r>
+              <a:rPr lang="en-US" b="1" dirty="0">
+                <a:solidFill>
+                  <a:srgbClr val="000000"/>
+                </a:solidFill>
+              </a:rPr>
+              <a:t>: </a:t>
+            </a:r>
+            <a:r>
+              <a:rPr lang="en-US" b="1" dirty="0">
+                <a:solidFill>
+                  <a:srgbClr val="4E9A06"/>
+                </a:solidFill>
+              </a:rPr>
+              <a:t>"22"</a:t>
+            </a:r>
+            <a:r>
+              <a:rPr lang="en-US" b="1" dirty="0">
+                <a:solidFill>
+                  <a:srgbClr val="000000"/>
+                </a:solidFill>
+              </a:rPr>
+              <a:t>,</a:t>
+            </a:r>
+          </a:p>
+          <a:p>
+            <a:r>
+              <a:rPr lang="en-US" dirty="0"/>
+              <a:t>  </a:t>
+            </a:r>
+            <a:r>
+              <a:rPr lang="en-US" b="1" dirty="0">
+                <a:solidFill>
+                  <a:srgbClr val="204A87"/>
+                </a:solidFill>
+              </a:rPr>
+              <a:t>"username"</a:t>
+            </a:r>
+            <a:r>
+              <a:rPr lang="en-US" b="1" dirty="0">
+                <a:solidFill>
+                  <a:srgbClr val="000000"/>
+                </a:solidFill>
+              </a:rPr>
+              <a:t>: </a:t>
+            </a:r>
+            <a:r>
+              <a:rPr lang="en-US" b="1" dirty="0">
+                <a:solidFill>
+                  <a:srgbClr val="4E9A06"/>
+                </a:solidFill>
+              </a:rPr>
+              <a:t>"THE_USERNAME"</a:t>
+            </a:r>
+            <a:r>
+              <a:rPr lang="en-US" b="1" dirty="0">
+                <a:solidFill>
+                  <a:srgbClr val="000000"/>
+                </a:solidFill>
+              </a:rPr>
+              <a:t>,</a:t>
+            </a:r>
+          </a:p>
+          <a:p>
+            <a:r>
+              <a:rPr lang="en-US" dirty="0"/>
+              <a:t>  </a:t>
+            </a:r>
+            <a:r>
+              <a:rPr lang="en-US" b="1" dirty="0">
+                <a:solidFill>
+                  <a:srgbClr val="204A87"/>
+                </a:solidFill>
+              </a:rPr>
+              <a:t>"password"</a:t>
+            </a:r>
+            <a:r>
+              <a:rPr lang="en-US" b="1" dirty="0">
+                <a:solidFill>
+                  <a:srgbClr val="000000"/>
+                </a:solidFill>
+              </a:rPr>
+              <a:t>: </a:t>
+            </a:r>
+            <a:r>
+              <a:rPr lang="en-US" b="1" dirty="0">
+                <a:solidFill>
+                  <a:srgbClr val="4E9A06"/>
+                </a:solidFill>
+              </a:rPr>
+              <a:t>"THE_PASSWORD"</a:t>
+            </a:r>
+            <a:r>
+              <a:rPr lang="en-US" b="1" dirty="0">
+                <a:solidFill>
+                  <a:srgbClr val="000000"/>
+                </a:solidFill>
+              </a:rPr>
+              <a:t>,</a:t>
+            </a:r>
+          </a:p>
+          <a:p>
+            <a:r>
+              <a:rPr lang="en-US" dirty="0"/>
+              <a:t>  </a:t>
+            </a:r>
+            <a:r>
+              <a:rPr lang="en-US" b="1" dirty="0">
+                <a:solidFill>
+                  <a:srgbClr val="204A87"/>
+                </a:solidFill>
+              </a:rPr>
+              <a:t>"target"</a:t>
+            </a:r>
+            <a:r>
+              <a:rPr lang="en-US" b="1" dirty="0">
+                <a:solidFill>
+                  <a:srgbClr val="000000"/>
+                </a:solidFill>
+              </a:rPr>
+              <a:t>: </a:t>
+            </a:r>
+            <a:r>
+              <a:rPr lang="en-US" b="1" dirty="0">
+                <a:solidFill>
+                  <a:srgbClr val="4E9A06"/>
+                </a:solidFill>
+              </a:rPr>
+              <a:t>"/home/chef"</a:t>
+            </a:r>
+            <a:r>
+              <a:rPr lang="en-US" b="1" dirty="0">
+                <a:solidFill>
+                  <a:srgbClr val="000000"/>
+                </a:solidFill>
+              </a:rPr>
+              <a:t>,</a:t>
+            </a:r>
+          </a:p>
+          <a:p>
+            <a:r>
+              <a:rPr lang="it-IT" dirty="0"/>
+              <a:t>  </a:t>
+            </a:r>
+            <a:r>
+              <a:rPr lang="it-IT" b="1" dirty="0">
+                <a:solidFill>
+                  <a:srgbClr val="204A87"/>
+                </a:solidFill>
+              </a:rPr>
+              <a:t>"</a:t>
+            </a:r>
+            <a:r>
+              <a:rPr lang="it-IT" b="1" dirty="0" err="1">
+                <a:solidFill>
+                  <a:srgbClr val="204A87"/>
+                </a:solidFill>
+              </a:rPr>
+              <a:t>ignore</a:t>
+            </a:r>
+            <a:r>
+              <a:rPr lang="it-IT" b="1" dirty="0">
+                <a:solidFill>
+                  <a:srgbClr val="204A87"/>
+                </a:solidFill>
+              </a:rPr>
+              <a:t>"</a:t>
+            </a:r>
+            <a:r>
+              <a:rPr lang="it-IT" b="1" dirty="0">
+                <a:solidFill>
+                  <a:srgbClr val="000000"/>
+                </a:solidFill>
+              </a:rPr>
+              <a:t>: [</a:t>
+            </a:r>
+          </a:p>
+          <a:p>
+            <a:r>
+              <a:rPr lang="nl-NL" dirty="0"/>
+              <a:t>    </a:t>
+            </a:r>
+            <a:r>
+              <a:rPr lang="nl-NL" dirty="0">
+                <a:solidFill>
+                  <a:srgbClr val="4E9A06"/>
+                </a:solidFill>
+              </a:rPr>
+              <a:t>".</a:t>
+            </a:r>
+            <a:r>
+              <a:rPr lang="nl-NL" dirty="0" err="1">
+                <a:solidFill>
+                  <a:srgbClr val="4E9A06"/>
+                </a:solidFill>
+              </a:rPr>
+              <a:t>chefdk</a:t>
+            </a:r>
+            <a:r>
+              <a:rPr lang="nl-NL" dirty="0">
+                <a:solidFill>
+                  <a:srgbClr val="4E9A06"/>
+                </a:solidFill>
+              </a:rPr>
+              <a:t>/**"</a:t>
+            </a:r>
+            <a:r>
+              <a:rPr lang="nl-NL" b="1" dirty="0">
+                <a:solidFill>
+                  <a:srgbClr val="000000"/>
+                </a:solidFill>
+              </a:rPr>
+              <a:t>,</a:t>
+            </a:r>
+          </a:p>
+          <a:p>
+            <a:r>
+              <a:rPr lang="nl-NL" dirty="0"/>
+              <a:t>    </a:t>
+            </a:r>
+            <a:r>
+              <a:rPr lang="nl-NL" dirty="0">
+                <a:solidFill>
+                  <a:srgbClr val="4E9A06"/>
+                </a:solidFill>
+              </a:rPr>
+              <a:t>".</a:t>
+            </a:r>
+            <a:r>
+              <a:rPr lang="nl-NL" dirty="0" err="1">
+                <a:solidFill>
+                  <a:srgbClr val="4E9A06"/>
+                </a:solidFill>
+              </a:rPr>
+              <a:t>chefdk</a:t>
+            </a:r>
+            <a:r>
+              <a:rPr lang="nl-NL" dirty="0">
+                <a:solidFill>
+                  <a:srgbClr val="4E9A06"/>
+                </a:solidFill>
+              </a:rPr>
+              <a:t>/**/.*"</a:t>
+            </a:r>
+            <a:r>
+              <a:rPr lang="nl-NL" b="1" dirty="0">
+                <a:solidFill>
+                  <a:srgbClr val="000000"/>
+                </a:solidFill>
+              </a:rPr>
+              <a:t>,</a:t>
+            </a:r>
+          </a:p>
+          <a:p>
+            <a:r>
+              <a:rPr lang="nl-NL" dirty="0"/>
+              <a:t>    </a:t>
+            </a:r>
+            <a:r>
+              <a:rPr lang="nl-NL" dirty="0">
+                <a:solidFill>
+                  <a:srgbClr val="4E9A06"/>
+                </a:solidFill>
+              </a:rPr>
+              <a:t>".gem/**"</a:t>
+            </a:r>
+            <a:r>
+              <a:rPr lang="nl-NL" b="1" dirty="0">
+                <a:solidFill>
+                  <a:srgbClr val="000000"/>
+                </a:solidFill>
+              </a:rPr>
+              <a:t>,</a:t>
+            </a:r>
+          </a:p>
+          <a:p>
+            <a:r>
+              <a:rPr lang="nl-NL" dirty="0"/>
+              <a:t>    </a:t>
+            </a:r>
+            <a:r>
+              <a:rPr lang="nl-NL" dirty="0">
+                <a:solidFill>
+                  <a:srgbClr val="4E9A06"/>
+                </a:solidFill>
+              </a:rPr>
+              <a:t>".git/**"</a:t>
+            </a:r>
+          </a:p>
+          <a:p>
+            <a:r>
+              <a:rPr lang="nl-NL" dirty="0"/>
+              <a:t>  </a:t>
+            </a:r>
+            <a:r>
+              <a:rPr lang="nl-NL" b="1" dirty="0">
+                <a:solidFill>
+                  <a:srgbClr val="000000"/>
+                </a:solidFill>
+              </a:rPr>
+              <a:t>],</a:t>
+            </a:r>
+          </a:p>
+          <a:p>
+            <a:r>
+              <a:rPr lang="nl-NL" dirty="0"/>
+              <a:t>  </a:t>
+            </a:r>
+            <a:r>
+              <a:rPr lang="nl-NL" b="1" dirty="0">
+                <a:solidFill>
+                  <a:srgbClr val="204A87"/>
+                </a:solidFill>
+              </a:rPr>
+              <a:t>"</a:t>
+            </a:r>
+            <a:r>
+              <a:rPr lang="nl-NL" b="1" dirty="0" err="1">
+                <a:solidFill>
+                  <a:srgbClr val="204A87"/>
+                </a:solidFill>
+              </a:rPr>
+              <a:t>uploadOnSave</a:t>
+            </a:r>
+            <a:r>
+              <a:rPr lang="nl-NL" b="1" dirty="0">
+                <a:solidFill>
+                  <a:srgbClr val="204A87"/>
+                </a:solidFill>
+              </a:rPr>
+              <a:t>"</a:t>
+            </a:r>
+            <a:r>
+              <a:rPr lang="nl-NL" b="1" dirty="0">
+                <a:solidFill>
+                  <a:srgbClr val="000000"/>
+                </a:solidFill>
+              </a:rPr>
+              <a:t>: </a:t>
+            </a:r>
+            <a:r>
+              <a:rPr lang="nl-NL" b="1" dirty="0" err="1">
+                <a:solidFill>
+                  <a:srgbClr val="204A87"/>
+                </a:solidFill>
+              </a:rPr>
+              <a:t>true</a:t>
+            </a:r>
+            <a:endParaRPr lang="nl-NL" b="1" dirty="0">
+              <a:solidFill>
+                <a:srgbClr val="204A87"/>
+              </a:solidFill>
+            </a:endParaRPr>
+          </a:p>
+          <a:p>
+            <a:r>
+              <a:rPr lang="nl-NL" b="1" dirty="0">
+                <a:solidFill>
+                  <a:srgbClr val="000000"/>
+                </a:solidFill>
+              </a:rPr>
+              <a:t>}</a:t>
+            </a:r>
+          </a:p>
+        </p:txBody>
+      </p:sp>
+      <p:sp>
+        <p:nvSpPr>
+          <p:cNvPr id="8" name="Text Placeholder 7"/>
+          <p:cNvSpPr>
+            <a:spLocks noGrp="1"/>
+          </p:cNvSpPr>
+          <p:nvPr>
+            <p:ph type="body" sz="quarter" idx="11"/>
+          </p:nvPr>
+        </p:nvSpPr>
+        <p:spPr/>
+        <p:txBody>
+          <a:bodyPr>
+            <a:normAutofit lnSpcReduction="10000"/>
+          </a:bodyPr>
+          <a:lstStyle/>
+          <a:p>
+            <a:r>
+              <a:rPr lang="en-US" dirty="0" smtClean="0"/>
+              <a:t>.remote-</a:t>
+            </a:r>
+            <a:r>
+              <a:rPr lang="en-US" dirty="0" err="1" smtClean="0"/>
+              <a:t>sync.json</a:t>
+            </a:r>
+            <a:endParaRPr lang="en-US" dirty="0"/>
           </a:p>
         </p:txBody>
       </p:sp>
     </p:spTree>
     <p:extLst>
       <p:ext uri="{BB962C8B-B14F-4D97-AF65-F5344CB8AC3E}">
-        <p14:creationId xmlns:p14="http://schemas.microsoft.com/office/powerpoint/2010/main" val="3584634851"/>
+        <p14:creationId xmlns:p14="http://schemas.microsoft.com/office/powerpoint/2010/main" val="2405500843"/>
       </p:ext>
     </p:extLst>
   </p:cSld>
@@ -10004,6 +10459,231 @@
           <a:p>
             <a:r>
               <a:rPr lang="en-US" dirty="0" smtClean="0"/>
+              <a:t>Reload the Configuration</a:t>
+            </a:r>
+            <a:endParaRPr lang="en-US" dirty="0"/>
+          </a:p>
+        </p:txBody>
+      </p:sp>
+      <p:pic>
+        <p:nvPicPr>
+          <p:cNvPr id="7" name="Picture Placeholder 6" descr=".remote-sync.json - _Users_nathenharvey_Desktop_giltsync - Atom.jpg"/>
+          <p:cNvPicPr>
+            <a:picLocks noGrp="1" noChangeAspect="1"/>
+          </p:cNvPicPr>
+          <p:nvPr>
+            <p:ph type="pic" sz="quarter" idx="10"/>
+          </p:nvPr>
+        </p:nvPicPr>
+        <p:blipFill>
+          <a:blip r:embed="rId2">
+            <a:extLst>
+              <a:ext uri="{28A0092B-C50C-407E-A947-70E740481C1C}">
+                <a14:useLocalDpi xmlns:a14="http://schemas.microsoft.com/office/drawing/2010/main" val="0"/>
+              </a:ext>
+            </a:extLst>
+          </a:blip>
+          <a:srcRect l="-50364" r="-50364"/>
+          <a:stretch>
+            <a:fillRect/>
+          </a:stretch>
+        </p:blipFill>
+        <p:spPr/>
+      </p:pic>
+      <p:sp>
+        <p:nvSpPr>
+          <p:cNvPr id="6" name="Content Placeholder 5"/>
+          <p:cNvSpPr>
+            <a:spLocks noGrp="1"/>
+          </p:cNvSpPr>
+          <p:nvPr>
+            <p:ph sz="quarter" idx="11"/>
+          </p:nvPr>
+        </p:nvSpPr>
+        <p:spPr/>
+        <p:txBody>
+          <a:bodyPr/>
+          <a:lstStyle/>
+          <a:p>
+            <a:endParaRPr lang="en-US"/>
+          </a:p>
+        </p:txBody>
+      </p:sp>
+    </p:spTree>
+    <p:extLst>
+      <p:ext uri="{BB962C8B-B14F-4D97-AF65-F5344CB8AC3E}">
+        <p14:creationId xmlns:p14="http://schemas.microsoft.com/office/powerpoint/2010/main" val="380423043"/>
+      </p:ext>
+    </p:extLst>
+  </p:cSld>
+  <p:clrMapOvr>
+    <a:masterClrMapping/>
+  </p:clrMapOvr>
+  <mc:AlternateContent xmlns:mc="http://schemas.openxmlformats.org/markup-compatibility/2006" xmlns:p14="http://schemas.microsoft.com/office/powerpoint/2010/main">
+    <mc:Choice Requires="p14">
+      <p:transition spd="med" p14:dur="700">
+        <p:fade/>
+      </p:transition>
+    </mc:Choice>
+    <mc:Fallback xmlns="">
+      <p:transition spd="med">
+        <p:fade/>
+      </p:transition>
+    </mc:Fallback>
+  </mc:AlternateContent>
+</p:sld>
+</file>
+
+<file path=ppt/slides/slide16.xml><?xml version="1.0" encoding="utf-8"?>
+<p:sld xmlns:a="http://schemas.openxmlformats.org/drawingml/2006/main" xmlns:r="http://schemas.openxmlformats.org/officeDocument/2006/relationships" xmlns:p="http://schemas.openxmlformats.org/presentationml/2006/main">
+  <p:cSld>
+    <p:spTree>
+      <p:nvGrpSpPr>
+        <p:cNvPr id="1" name=""/>
+        <p:cNvGrpSpPr/>
+        <p:nvPr/>
+      </p:nvGrpSpPr>
+      <p:grpSpPr>
+        <a:xfrm>
+          <a:off x="0" y="0"/>
+          <a:ext cx="0" cy="0"/>
+          <a:chOff x="0" y="0"/>
+          <a:chExt cx="0" cy="0"/>
+        </a:xfrm>
+      </p:grpSpPr>
+      <p:sp>
+        <p:nvSpPr>
+          <p:cNvPr id="2" name="Title 1"/>
+          <p:cNvSpPr>
+            <a:spLocks noGrp="1"/>
+          </p:cNvSpPr>
+          <p:nvPr>
+            <p:ph type="title"/>
+          </p:nvPr>
+        </p:nvSpPr>
+        <p:spPr/>
+        <p:txBody>
+          <a:bodyPr/>
+          <a:lstStyle/>
+          <a:p>
+            <a:r>
+              <a:rPr lang="en-US" dirty="0" smtClean="0"/>
+              <a:t>Remote Sync: Download All</a:t>
+            </a:r>
+            <a:endParaRPr lang="en-US" dirty="0"/>
+          </a:p>
+        </p:txBody>
+      </p:sp>
+      <p:pic>
+        <p:nvPicPr>
+          <p:cNvPr id="8" name="Picture Placeholder 7" descr=".remote-sync.json - _Users_nathenharvey_Desktop_giltsync - Atom-1.jpg"/>
+          <p:cNvPicPr>
+            <a:picLocks noGrp="1" noChangeAspect="1"/>
+          </p:cNvPicPr>
+          <p:nvPr>
+            <p:ph type="pic" sz="quarter" idx="10"/>
+          </p:nvPr>
+        </p:nvPicPr>
+        <p:blipFill>
+          <a:blip r:embed="rId2">
+            <a:extLst>
+              <a:ext uri="{28A0092B-C50C-407E-A947-70E740481C1C}">
+                <a14:useLocalDpi xmlns:a14="http://schemas.microsoft.com/office/drawing/2010/main" val="0"/>
+              </a:ext>
+            </a:extLst>
+          </a:blip>
+          <a:srcRect l="-22383" r="-22383"/>
+          <a:stretch>
+            <a:fillRect/>
+          </a:stretch>
+        </p:blipFill>
+        <p:spPr/>
+      </p:pic>
+      <p:sp>
+        <p:nvSpPr>
+          <p:cNvPr id="7" name="Content Placeholder 6"/>
+          <p:cNvSpPr>
+            <a:spLocks noGrp="1"/>
+          </p:cNvSpPr>
+          <p:nvPr>
+            <p:ph sz="quarter" idx="11"/>
+          </p:nvPr>
+        </p:nvSpPr>
+        <p:spPr/>
+        <p:txBody>
+          <a:bodyPr/>
+          <a:lstStyle/>
+          <a:p>
+            <a:endParaRPr lang="en-US"/>
+          </a:p>
+        </p:txBody>
+      </p:sp>
+    </p:spTree>
+    <p:extLst>
+      <p:ext uri="{BB962C8B-B14F-4D97-AF65-F5344CB8AC3E}">
+        <p14:creationId xmlns:p14="http://schemas.microsoft.com/office/powerpoint/2010/main" val="3584634851"/>
+      </p:ext>
+    </p:extLst>
+  </p:cSld>
+  <p:clrMapOvr>
+    <a:masterClrMapping/>
+  </p:clrMapOvr>
+  <mc:AlternateContent xmlns:mc="http://schemas.openxmlformats.org/markup-compatibility/2006" xmlns:p14="http://schemas.microsoft.com/office/powerpoint/2010/main">
+    <mc:Choice Requires="p14">
+      <p:transition spd="med" p14:dur="700">
+        <p:fade/>
+      </p:transition>
+    </mc:Choice>
+    <mc:Fallback xmlns="">
+      <p:transition spd="med">
+        <p:fade/>
+      </p:transition>
+    </mc:Fallback>
+  </mc:AlternateContent>
+  <p:timing>
+    <p:tnLst>
+      <p:par>
+        <p:cTn xmlns:p14="http://schemas.microsoft.com/office/powerpoint/2010/main" id="1" dur="indefinite" restart="never" nodeType="tmRoot"/>
+      </p:par>
+    </p:tnLst>
+  </p:timing>
+</p:sld>
+</file>
+
+<file path=ppt/slides/slide17.xml><?xml version="1.0" encoding="utf-8"?>
+<p:sld xmlns:a="http://schemas.openxmlformats.org/drawingml/2006/main" xmlns:r="http://schemas.openxmlformats.org/officeDocument/2006/relationships" xmlns:p="http://schemas.openxmlformats.org/presentationml/2006/main">
+  <p:cSld>
+    <p:spTree>
+      <p:nvGrpSpPr>
+        <p:cNvPr id="1" name=""/>
+        <p:cNvGrpSpPr/>
+        <p:nvPr/>
+      </p:nvGrpSpPr>
+      <p:grpSpPr>
+        <a:xfrm>
+          <a:off x="0" y="0"/>
+          <a:ext cx="0" cy="0"/>
+          <a:chOff x="0" y="0"/>
+          <a:chExt cx="0" cy="0"/>
+        </a:xfrm>
+      </p:grpSpPr>
+      <p:sp>
+        <p:nvSpPr>
+          <p:cNvPr id="2" name="Title 1"/>
+          <p:cNvSpPr>
+            <a:spLocks noGrp="1"/>
+          </p:cNvSpPr>
+          <p:nvPr>
+            <p:ph type="title"/>
+          </p:nvPr>
+        </p:nvSpPr>
+        <p:spPr/>
+        <p:txBody>
+          <a:bodyPr/>
+          <a:lstStyle/>
+          <a:p>
+            <a:r>
+              <a:rPr lang="en-US" dirty="0" smtClean="0"/>
               <a:t>Sync </a:t>
             </a:r>
             <a:r>
@@ -10122,7 +10802,7 @@
 </p:sld>
 </file>
 
-<file path=ppt/slides/slide16.xml><?xml version="1.0" encoding="utf-8"?>
+<file path=ppt/slides/slide18.xml><?xml version="1.0" encoding="utf-8"?>
 <p:sld xmlns:a="http://schemas.openxmlformats.org/drawingml/2006/main" xmlns:r="http://schemas.openxmlformats.org/officeDocument/2006/relationships" xmlns:p="http://schemas.openxmlformats.org/presentationml/2006/main">
   <p:cSld>
     <p:spTree>
@@ -10269,7 +10949,7 @@
                   <a:srgbClr val="4E9A06"/>
                 </a:solidFill>
               </a:rPr>
-              <a:t>"54.173.151.68"</a:t>
+              <a:t>"THE_REMOTE_IP_ADDRESS"</a:t>
             </a:r>
             <a:r>
               <a:rPr lang="en-US" b="1" dirty="0">
@@ -10345,7 +11025,7 @@
                   <a:srgbClr val="4E9A06"/>
                 </a:solidFill>
               </a:rPr>
-              <a:t>"chef"</a:t>
+              <a:t>"THE_USERNAME"</a:t>
             </a:r>
             <a:r>
               <a:rPr lang="en-US" b="1" dirty="0">
@@ -10383,15 +11063,7 @@
                   <a:srgbClr val="4E9A06"/>
                 </a:solidFill>
               </a:rPr>
-              <a:t>"</a:t>
-            </a:r>
-            <a:r>
-              <a:rPr lang="en-US" b="1" dirty="0" smtClean="0">
-                <a:solidFill>
-                  <a:srgbClr val="4E9A06"/>
-                </a:solidFill>
-              </a:rPr>
-              <a:t>chef"</a:t>
+              <a:t>"THE_PASSWORD"</a:t>
             </a:r>
             <a:r>
               <a:rPr lang="en-US" b="1" dirty="0">
@@ -10566,6 +11238,28 @@
                 </a:solidFill>
               </a:rPr>
               <a:t>".gem/**"</a:t>
+            </a:r>
+            <a:r>
+              <a:rPr lang="nl-NL" b="1" dirty="0">
+                <a:solidFill>
+                  <a:srgbClr val="000000"/>
+                </a:solidFill>
+              </a:rPr>
+              <a:t>,</a:t>
+            </a:r>
+          </a:p>
+          <a:p>
+            <a:r>
+              <a:rPr lang="nl-NL" dirty="0"/>
+              <a:t>    </a:t>
+            </a:r>
+            <a:r>
+              <a:rPr lang="nl-NL" dirty="0">
+                <a:solidFill>
+                  <a:srgbClr val="4E9A06"/>
+                </a:solidFill>
+              </a:rPr>
+              <a:t>".git/**"</a:t>
             </a:r>
           </a:p>
           <a:p>
@@ -11485,7 +12179,7 @@
 </file>
 
 <file path=ppt/slides/slide9.xml><?xml version="1.0" encoding="utf-8"?>
-<p:sld xmlns:a="http://schemas.openxmlformats.org/drawingml/2006/main" xmlns:r="http://schemas.openxmlformats.org/officeDocument/2006/relationships" xmlns:p="http://schemas.openxmlformats.org/presentationml/2006/main" show="0">
+<p:sld xmlns:a="http://schemas.openxmlformats.org/drawingml/2006/main" xmlns:r="http://schemas.openxmlformats.org/officeDocument/2006/relationships" xmlns:p="http://schemas.openxmlformats.org/presentationml/2006/main">
   <p:cSld>
     <p:spTree>
       <p:nvGrpSpPr>
@@ -11503,7 +12197,7 @@
       </p:grpSpPr>
       <p:sp>
         <p:nvSpPr>
-          <p:cNvPr id="5" name="Title 4"/>
+          <p:cNvPr id="2" name="Title 1"/>
           <p:cNvSpPr>
             <a:spLocks noGrp="1"/>
           </p:cNvSpPr>
@@ -11518,101 +12212,77 @@
           <a:p>
             <a:r>
               <a:rPr lang="en-US" dirty="0" smtClean="0"/>
-              <a:t>Open the README</a:t>
+              <a:t>Open a Folder in Atom</a:t>
             </a:r>
             <a:endParaRPr lang="en-US" dirty="0"/>
           </a:p>
         </p:txBody>
       </p:sp>
-      <p:pic>
-        <p:nvPicPr>
-          <p:cNvPr id="6" name="Picture 5" descr="untitled - Atom-1.jpg"/>
-          <p:cNvPicPr>
-            <a:picLocks noChangeAspect="1"/>
-          </p:cNvPicPr>
-          <p:nvPr/>
-        </p:nvPicPr>
-        <p:blipFill>
-          <a:blip r:embed="rId2">
-            <a:extLst>
-              <a:ext uri="{28A0092B-C50C-407E-A947-70E740481C1C}">
-                <a14:useLocalDpi xmlns:a14="http://schemas.microsoft.com/office/drawing/2010/main" val="0"/>
-              </a:ext>
-            </a:extLst>
-          </a:blip>
-          <a:stretch>
-            <a:fillRect/>
-          </a:stretch>
-        </p:blipFill>
-        <p:spPr>
-          <a:xfrm>
-            <a:off x="449384" y="1179146"/>
-            <a:ext cx="5705230" cy="2800433"/>
-          </a:xfrm>
-          <a:prstGeom prst="rect">
-            <a:avLst/>
-          </a:prstGeom>
-        </p:spPr>
-      </p:pic>
-      <p:pic>
-        <p:nvPicPr>
-          <p:cNvPr id="7" name="Picture 6" descr="Settings - _Users_nathenharvey_.atom_packages_remote-sync - Atom.jpg"/>
-          <p:cNvPicPr>
-            <a:picLocks noChangeAspect="1"/>
-          </p:cNvPicPr>
-          <p:nvPr/>
-        </p:nvPicPr>
-        <p:blipFill>
-          <a:blip r:embed="rId3">
-            <a:extLst>
-              <a:ext uri="{28A0092B-C50C-407E-A947-70E740481C1C}">
-                <a14:useLocalDpi xmlns:a14="http://schemas.microsoft.com/office/drawing/2010/main" val="0"/>
-              </a:ext>
-            </a:extLst>
-          </a:blip>
-          <a:stretch>
-            <a:fillRect/>
-          </a:stretch>
-        </p:blipFill>
-        <p:spPr>
-          <a:xfrm>
-            <a:off x="4826000" y="4148854"/>
-            <a:ext cx="6838462" cy="2298838"/>
-          </a:xfrm>
-          <a:prstGeom prst="rect">
-            <a:avLst/>
-          </a:prstGeom>
-        </p:spPr>
-      </p:pic>
+      <p:sp>
+        <p:nvSpPr>
+          <p:cNvPr id="5" name="Text Placeholder 4"/>
+          <p:cNvSpPr>
+            <a:spLocks noGrp="1"/>
+          </p:cNvSpPr>
+          <p:nvPr>
+            <p:ph type="body" sz="quarter" idx="10"/>
+          </p:nvPr>
+        </p:nvSpPr>
+        <p:spPr/>
+        <p:txBody>
+          <a:bodyPr/>
+          <a:lstStyle/>
+          <a:p>
+            <a:r>
+              <a:rPr lang="en-US" dirty="0" smtClean="0"/>
+              <a:t>Create a folder where you will store your work for this class.  The folder can be empty for now.</a:t>
+            </a:r>
+          </a:p>
+          <a:p>
+            <a:r>
+              <a:rPr lang="en-US" dirty="0" smtClean="0"/>
+              <a:t>Open the folder in Atom</a:t>
+            </a:r>
+          </a:p>
+          <a:p>
+            <a:pPr lvl="1"/>
+            <a:r>
+              <a:rPr lang="en-US" dirty="0" smtClean="0"/>
+              <a:t>File &gt; Open … select the folder (Mac)</a:t>
+            </a:r>
+          </a:p>
+          <a:p>
+            <a:pPr lvl="1"/>
+            <a:r>
+              <a:rPr lang="en-US" dirty="0" smtClean="0"/>
+              <a:t>File &gt; Open Folder … select the folder (Windows)</a:t>
+            </a:r>
+            <a:endParaRPr lang="en-US" dirty="0"/>
+          </a:p>
+        </p:txBody>
+      </p:sp>
     </p:spTree>
     <p:extLst>
       <p:ext uri="{BB962C8B-B14F-4D97-AF65-F5344CB8AC3E}">
-        <p14:creationId xmlns:p14="http://schemas.microsoft.com/office/powerpoint/2010/main" val="2810748204"/>
+        <p14:creationId xmlns:p14="http://schemas.microsoft.com/office/powerpoint/2010/main" val="1714183044"/>
       </p:ext>
     </p:extLst>
   </p:cSld>
   <p:clrMapOvr>
     <a:masterClrMapping/>
   </p:clrMapOvr>
-  <mc:AlternateContent xmlns:mc="http://schemas.openxmlformats.org/markup-compatibility/2006">
-    <mc:Choice xmlns:p14="http://schemas.microsoft.com/office/powerpoint/2010/main" Requires="p14">
+  <mc:AlternateContent xmlns:mc="http://schemas.openxmlformats.org/markup-compatibility/2006" xmlns:p14="http://schemas.microsoft.com/office/powerpoint/2010/main">
+    <mc:Choice Requires="p14">
       <p:transition spd="med" p14:dur="700">
         <p:fade/>
       </p:transition>
     </mc:Choice>
-    <mc:Fallback>
-      <p:transition xmlns:p14="http://schemas.microsoft.com/office/powerpoint/2010/main" spd="med">
+    <mc:Fallback xmlns="">
+      <p:transition spd="med">
         <p:fade/>
       </p:transition>
     </mc:Fallback>
   </mc:AlternateContent>
-  <p:timing>
-    <p:tnLst>
-      <p:par>
-        <p:cTn xmlns:p14="http://schemas.microsoft.com/office/powerpoint/2010/main" id="1" dur="indefinite" restart="never" nodeType="tmRoot"/>
-      </p:par>
-    </p:tnLst>
-  </p:timing>
 </p:sld>
 </file>
 
@@ -11975,7 +12645,7 @@
   <a:extraClrSchemeLst/>
   <a:extLst>
     <a:ext uri="{05A4C25C-085E-4340-85A3-A5531E510DB2}">
-      <thm15:themeFamily xmlns:thm15="http://schemas.microsoft.com/office/thememl/2012/main" xmlns="" name="Chef-TemplateComps_v09-16x9-Light.potx" id="{078CEFDB-FA7A-4E36-9964-13EF367585CB}" vid="{8B87B0F3-7308-43D5-8388-E1B49EA02652}"/>
+      <thm15:themeFamily xmlns="" xmlns:thm15="http://schemas.microsoft.com/office/thememl/2012/main" name="Chef-TemplateComps_v09-16x9-Light.potx" id="{078CEFDB-FA7A-4E36-9964-13EF367585CB}" vid="{8B87B0F3-7308-43D5-8388-E1B49EA02652}"/>
     </a:ext>
   </a:extLst>
 </a:theme>

</xml_diff>